<commit_message>
Updates from Nan Xianghao
</commit_message>
<xml_diff>
--- a/slides/CPK系统(中).pptx
+++ b/slides/CPK系统(中).pptx
@@ -10,14 +10,13 @@
   <p:sldIdLst>
     <p:sldId id="271" r:id="rId3"/>
     <p:sldId id="286" r:id="rId4"/>
-    <p:sldId id="293" r:id="rId6"/>
+    <p:sldId id="281" r:id="rId6"/>
     <p:sldId id="294" r:id="rId7"/>
     <p:sldId id="295" r:id="rId8"/>
     <p:sldId id="296" r:id="rId9"/>
-    <p:sldId id="281" r:id="rId10"/>
-    <p:sldId id="257" r:id="rId11"/>
-    <p:sldId id="285" r:id="rId12"/>
-    <p:sldId id="292" r:id="rId13"/>
+    <p:sldId id="257" r:id="rId10"/>
+    <p:sldId id="285" r:id="rId11"/>
+    <p:sldId id="292" r:id="rId12"/>
   </p:sldIdLst>
   <p:sldSz cx="12192000" cy="6858000"/>
   <p:notesSz cx="6858000" cy="9144000"/>
@@ -123,11 +122,10 @@
           <p14:sldIdLst>
             <p14:sldId id="271"/>
             <p14:sldId id="286"/>
-            <p14:sldId id="293"/>
+            <p14:sldId id="281"/>
             <p14:sldId id="294"/>
             <p14:sldId id="295"/>
             <p14:sldId id="296"/>
-            <p14:sldId id="281"/>
             <p14:sldId id="257"/>
             <p14:sldId id="285"/>
             <p14:sldId id="292"/>
@@ -3490,105 +3488,6 @@
 </p:sld>
 </file>
 
-<file path=ppt/slides/slide10.xml><?xml version="1.0" encoding="utf-8"?>
-<p:sld xmlns:a="http://schemas.openxmlformats.org/drawingml/2006/main" xmlns:r="http://schemas.openxmlformats.org/officeDocument/2006/relationships" xmlns:p="http://schemas.openxmlformats.org/presentationml/2006/main">
-  <p:cSld>
-    <p:spTree>
-      <p:nvGrpSpPr>
-        <p:cNvPr id="1" name=""/>
-        <p:cNvGrpSpPr/>
-        <p:nvPr/>
-      </p:nvGrpSpPr>
-      <p:grpSpPr/>
-      <p:sp>
-        <p:nvSpPr>
-          <p:cNvPr id="2" name="标题 1"/>
-          <p:cNvSpPr>
-            <a:spLocks noGrp="1"/>
-          </p:cNvSpPr>
-          <p:nvPr>
-            <p:ph type="title"/>
-          </p:nvPr>
-        </p:nvSpPr>
-        <p:spPr/>
-        <p:txBody>
-          <a:bodyPr/>
-          <a:p>
-            <a:r>
-              <a:rPr lang="zh-CN" altLang="en-US" b="1">
-                <a:latin typeface="微软雅黑" panose="020B0503020204020204" charset="-122"/>
-                <a:ea typeface="微软雅黑" panose="020B0503020204020204" charset="-122"/>
-              </a:rPr>
-              <a:t>提问</a:t>
-            </a:r>
-            <a:endParaRPr lang="zh-CN" altLang="en-US" b="1">
-              <a:latin typeface="微软雅黑" panose="020B0503020204020204" charset="-122"/>
-              <a:ea typeface="微软雅黑" panose="020B0503020204020204" charset="-122"/>
-            </a:endParaRPr>
-          </a:p>
-        </p:txBody>
-      </p:sp>
-      <p:sp>
-        <p:nvSpPr>
-          <p:cNvPr id="3" name="内容占位符 2"/>
-          <p:cNvSpPr>
-            <a:spLocks noGrp="1"/>
-          </p:cNvSpPr>
-          <p:nvPr>
-            <p:ph idx="1"/>
-          </p:nvPr>
-        </p:nvSpPr>
-        <p:spPr/>
-        <p:txBody>
-          <a:bodyPr/>
-          <a:p>
-            <a:pPr marL="0" indent="0">
-              <a:buNone/>
-            </a:pPr>
-            <a:endParaRPr lang="zh-CN" altLang="en-US"/>
-          </a:p>
-          <a:p>
-            <a:pPr marL="0" indent="0">
-              <a:buNone/>
-            </a:pPr>
-            <a:endParaRPr lang="zh-CN" altLang="en-US"/>
-          </a:p>
-          <a:p>
-            <a:pPr marL="0" indent="0">
-              <a:buNone/>
-            </a:pPr>
-            <a:endParaRPr lang="zh-CN" altLang="en-US"/>
-          </a:p>
-          <a:p>
-            <a:pPr marL="0" indent="0">
-              <a:buNone/>
-            </a:pPr>
-            <a:r>
-              <a:rPr lang="zh-CN" altLang="en-US"/>
-              <a:t>                                                  </a:t>
-            </a:r>
-            <a:r>
-              <a:rPr lang="zh-CN" altLang="en-US" sz="6000" b="1">
-                <a:latin typeface="微软雅黑" panose="020B0503020204020204" charset="-122"/>
-                <a:ea typeface="微软雅黑" panose="020B0503020204020204" charset="-122"/>
-              </a:rPr>
-              <a:t>谢谢</a:t>
-            </a:r>
-            <a:endParaRPr lang="zh-CN" altLang="en-US" sz="6000" b="1">
-              <a:latin typeface="微软雅黑" panose="020B0503020204020204" charset="-122"/>
-              <a:ea typeface="微软雅黑" panose="020B0503020204020204" charset="-122"/>
-            </a:endParaRPr>
-          </a:p>
-        </p:txBody>
-      </p:sp>
-    </p:spTree>
-  </p:cSld>
-  <p:clrMapOvr>
-    <a:masterClrMapping/>
-  </p:clrMapOvr>
-</p:sld>
-</file>
-
 <file path=ppt/slides/slide2.xml><?xml version="1.0" encoding="utf-8"?>
 <p:sld xmlns:a="http://schemas.openxmlformats.org/drawingml/2006/main" xmlns:r="http://schemas.openxmlformats.org/officeDocument/2006/relationships" xmlns:p="http://schemas.openxmlformats.org/presentationml/2006/main">
   <p:cSld>
@@ -3626,7 +3525,7 @@
                 <a:latin typeface="微软雅黑" panose="020B0503020204020204" charset="-122"/>
                 <a:ea typeface="微软雅黑" panose="020B0503020204020204" charset="-122"/>
               </a:rPr>
-              <a:t>研究对象</a:t>
+              <a:t>研究范畴</a:t>
             </a:r>
             <a:endParaRPr lang="zh-CN" altLang="en-US" sz="4000" b="1">
               <a:latin typeface="微软雅黑" panose="020B0503020204020204" charset="-122"/>
@@ -3800,8 +3699,8 @@
         </p:nvCxnSpPr>
         <p:spPr>
           <a:xfrm flipH="1">
-            <a:off x="3235325" y="2402205"/>
-            <a:ext cx="20955" cy="796925"/>
+            <a:off x="3267075" y="2508885"/>
+            <a:ext cx="20320" cy="476885"/>
           </a:xfrm>
           <a:prstGeom prst="line">
             <a:avLst/>
@@ -3831,8 +3730,8 @@
         </p:nvCxnSpPr>
         <p:spPr>
           <a:xfrm flipH="1">
-            <a:off x="8611235" y="2350770"/>
-            <a:ext cx="6350" cy="890270"/>
+            <a:off x="8607425" y="2350770"/>
+            <a:ext cx="10160" cy="587375"/>
           </a:xfrm>
           <a:prstGeom prst="line">
             <a:avLst/>
@@ -3864,7 +3763,7 @@
         </p:nvCxnSpPr>
         <p:spPr>
           <a:xfrm flipH="1">
-            <a:off x="5890895" y="2110740"/>
+            <a:off x="5923915" y="2110740"/>
             <a:ext cx="5080" cy="281305"/>
           </a:xfrm>
           <a:prstGeom prst="line">
@@ -3895,7 +3794,7 @@
         </p:nvCxnSpPr>
         <p:spPr>
           <a:xfrm>
-            <a:off x="2216785" y="4022725"/>
+            <a:off x="2232660" y="3807460"/>
             <a:ext cx="2099310" cy="3810"/>
           </a:xfrm>
           <a:prstGeom prst="line">
@@ -3926,7 +3825,7 @@
         </p:nvCxnSpPr>
         <p:spPr>
           <a:xfrm flipV="1">
-            <a:off x="7217410" y="4102735"/>
+            <a:off x="7218045" y="3752215"/>
             <a:ext cx="2592705" cy="7620"/>
           </a:xfrm>
           <a:prstGeom prst="line">
@@ -3956,9 +3855,9 @@
           <p:nvPr/>
         </p:nvCxnSpPr>
         <p:spPr>
-          <a:xfrm>
-            <a:off x="3256280" y="3634740"/>
-            <a:ext cx="20320" cy="387985"/>
+          <a:xfrm flipH="1">
+            <a:off x="3267075" y="3399790"/>
+            <a:ext cx="10160" cy="478790"/>
           </a:xfrm>
           <a:prstGeom prst="line">
             <a:avLst/>
@@ -3983,14 +3882,12 @@
       <p:cxnSp>
         <p:nvCxnSpPr>
           <p:cNvPr id="11" name="直接连接符 10"/>
-          <p:cNvCxnSpPr>
-            <a:stCxn id="18" idx="2"/>
-          </p:cNvCxnSpPr>
+          <p:cNvCxnSpPr/>
           <p:nvPr/>
         </p:nvCxnSpPr>
         <p:spPr>
           <a:xfrm>
-            <a:off x="8611235" y="3769360"/>
+            <a:off x="8604885" y="3364230"/>
             <a:ext cx="6350" cy="327660"/>
           </a:xfrm>
           <a:prstGeom prst="line">
@@ -4020,9 +3917,9 @@
           <p:nvPr/>
         </p:nvCxnSpPr>
         <p:spPr>
-          <a:xfrm>
-            <a:off x="2216785" y="4102735"/>
-            <a:ext cx="8255" cy="269875"/>
+          <a:xfrm flipH="1">
+            <a:off x="2214880" y="3878580"/>
+            <a:ext cx="17780" cy="417195"/>
           </a:xfrm>
           <a:prstGeom prst="line">
             <a:avLst/>
@@ -4047,13 +3944,15 @@
       <p:cxnSp>
         <p:nvCxnSpPr>
           <p:cNvPr id="13" name="直接连接符 12"/>
-          <p:cNvCxnSpPr/>
+          <p:cNvCxnSpPr>
+            <a:endCxn id="20" idx="0"/>
+          </p:cNvCxnSpPr>
           <p:nvPr/>
         </p:nvCxnSpPr>
         <p:spPr>
           <a:xfrm flipH="1">
-            <a:off x="4298315" y="4085590"/>
-            <a:ext cx="17780" cy="226060"/>
+            <a:off x="4307205" y="3867150"/>
+            <a:ext cx="31750" cy="454660"/>
           </a:xfrm>
           <a:prstGeom prst="line">
             <a:avLst/>
@@ -4083,7 +3982,7 @@
         </p:nvCxnSpPr>
         <p:spPr>
           <a:xfrm flipH="1">
-            <a:off x="7168515" y="4102735"/>
+            <a:off x="7218045" y="3807460"/>
             <a:ext cx="8255" cy="462915"/>
           </a:xfrm>
           <a:prstGeom prst="line">
@@ -4113,9 +4012,9 @@
           <p:nvPr/>
         </p:nvCxnSpPr>
         <p:spPr>
-          <a:xfrm>
-            <a:off x="9807575" y="4097020"/>
-            <a:ext cx="2540" cy="401955"/>
+          <a:xfrm flipH="1">
+            <a:off x="9771380" y="3759835"/>
+            <a:ext cx="10160" cy="510540"/>
           </a:xfrm>
           <a:prstGeom prst="line">
             <a:avLst/>
@@ -4145,7 +4044,7 @@
         </p:nvSpPr>
         <p:spPr>
           <a:xfrm>
-            <a:off x="4892675" y="1384935"/>
+            <a:off x="4925695" y="1384935"/>
             <a:ext cx="2005965" cy="725805"/>
           </a:xfrm>
           <a:prstGeom prst="rect">
@@ -4219,7 +4118,7 @@
         </p:nvSpPr>
         <p:spPr>
           <a:xfrm>
-            <a:off x="2402205" y="3199130"/>
+            <a:off x="2433955" y="2985770"/>
             <a:ext cx="1665605" cy="459105"/>
           </a:xfrm>
           <a:prstGeom prst="rect">
@@ -4293,7 +4192,7 @@
         </p:nvSpPr>
         <p:spPr>
           <a:xfrm>
-            <a:off x="7753350" y="3310255"/>
+            <a:off x="7855585" y="2905125"/>
             <a:ext cx="1715135" cy="459105"/>
           </a:xfrm>
           <a:prstGeom prst="rect">
@@ -4504,7 +4403,7 @@
         </p:nvSpPr>
         <p:spPr>
           <a:xfrm>
-            <a:off x="6460490" y="4372610"/>
+            <a:off x="6508750" y="4270375"/>
             <a:ext cx="1655445" cy="493395"/>
           </a:xfrm>
           <a:prstGeom prst="rect">
@@ -4576,7 +4475,7 @@
         </p:nvSpPr>
         <p:spPr>
           <a:xfrm>
-            <a:off x="8813800" y="4345305"/>
+            <a:off x="8854440" y="4266565"/>
             <a:ext cx="1655445" cy="490220"/>
           </a:xfrm>
           <a:prstGeom prst="rect">
@@ -4641,8 +4540,8 @@
         </p:nvSpPr>
         <p:spPr>
           <a:xfrm>
-            <a:off x="764540" y="2898775"/>
-            <a:ext cx="4835525" cy="3440430"/>
+            <a:off x="724535" y="2675255"/>
+            <a:ext cx="5146040" cy="3858260"/>
           </a:xfrm>
           <a:prstGeom prst="ellipse">
             <a:avLst/>
@@ -4696,8 +4595,8 @@
         </p:nvSpPr>
         <p:spPr>
           <a:xfrm>
-            <a:off x="6038215" y="2939415"/>
-            <a:ext cx="4950460" cy="3399790"/>
+            <a:off x="6024880" y="2602865"/>
+            <a:ext cx="5195570" cy="3930650"/>
           </a:xfrm>
           <a:prstGeom prst="ellipse">
             <a:avLst/>
@@ -4751,7 +4650,7 @@
         </p:nvSpPr>
         <p:spPr>
           <a:xfrm>
-            <a:off x="775970" y="3444875"/>
+            <a:off x="586105" y="3444875"/>
             <a:ext cx="2450465" cy="767715"/>
           </a:xfrm>
           <a:prstGeom prst="rect">
@@ -4829,7 +4728,7 @@
         </p:nvSpPr>
         <p:spPr>
           <a:xfrm>
-            <a:off x="5859780" y="3364230"/>
+            <a:off x="8854440" y="3188970"/>
             <a:ext cx="2450465" cy="1134745"/>
           </a:xfrm>
           <a:prstGeom prst="rect">
@@ -4907,7 +4806,7 @@
         </p:nvSpPr>
         <p:spPr>
           <a:xfrm>
-            <a:off x="2049145" y="5410835"/>
+            <a:off x="2065020" y="5340985"/>
             <a:ext cx="2266950" cy="704850"/>
           </a:xfrm>
           <a:prstGeom prst="rect">
@@ -4983,7 +4882,7 @@
         </p:nvSpPr>
         <p:spPr>
           <a:xfrm>
-            <a:off x="7339965" y="5271135"/>
+            <a:off x="7340600" y="5138420"/>
             <a:ext cx="2348230" cy="844550"/>
           </a:xfrm>
           <a:prstGeom prst="rect">
@@ -5083,77 +4982,184 @@
         <p:txBody>
           <a:bodyPr/>
           <a:p>
+            <a:pPr algn="l"/>
+            <a:r>
+              <a:rPr lang="en-US" altLang="zh-CN" sz="4000" b="1">
+                <a:latin typeface="Microsoft YaHei UI" panose="020B0503020204020204" charset="-122"/>
+                <a:ea typeface="Microsoft YaHei UI" panose="020B0503020204020204" charset="-122"/>
+              </a:rPr>
+              <a:t>CPK</a:t>
+            </a:r>
             <a:r>
               <a:rPr lang="zh-CN" altLang="en-US" sz="4000" b="1">
+                <a:latin typeface="Microsoft YaHei UI" panose="020B0503020204020204" charset="-122"/>
+                <a:ea typeface="Microsoft YaHei UI" panose="020B0503020204020204" charset="-122"/>
+              </a:rPr>
+              <a:t>基本技术</a:t>
+            </a:r>
+            <a:endParaRPr lang="zh-CN" altLang="en-US" sz="4000" b="1">
+              <a:latin typeface="Microsoft YaHei UI" panose="020B0503020204020204" charset="-122"/>
+              <a:ea typeface="Microsoft YaHei UI" panose="020B0503020204020204" charset="-122"/>
+            </a:endParaRPr>
+          </a:p>
+        </p:txBody>
+      </p:sp>
+      <p:sp>
+        <p:nvSpPr>
+          <p:cNvPr id="3" name="内容占位符 2"/>
+          <p:cNvSpPr>
+            <a:spLocks noGrp="1"/>
+          </p:cNvSpPr>
+          <p:nvPr>
+            <p:ph idx="1"/>
+          </p:nvPr>
+        </p:nvSpPr>
+        <p:spPr>
+          <a:xfrm>
+            <a:off x="737235" y="2213610"/>
+            <a:ext cx="10616565" cy="3371850"/>
+          </a:xfrm>
+        </p:spPr>
+        <p:txBody>
+          <a:bodyPr>
+            <a:normAutofit/>
+          </a:bodyPr>
+          <a:p>
+            <a:pPr marL="0" indent="0">
+              <a:buNone/>
+            </a:pPr>
+            <a:r>
+              <a:rPr lang="en-US" altLang="zh-CN" b="1">
+                <a:solidFill>
+                  <a:srgbClr val="002060"/>
+                </a:solidFill>
                 <a:latin typeface="微软雅黑" panose="020B0503020204020204" charset="-122"/>
                 <a:ea typeface="微软雅黑" panose="020B0503020204020204" charset="-122"/>
-                <a:sym typeface="+mn-ea"/>
-              </a:rPr>
-              <a:t>CPK安全策略</a:t>
-            </a:r>
-            <a:endParaRPr lang="zh-CN" altLang="en-US" sz="4000" b="1">
+              </a:rPr>
+              <a:t>CPK </a:t>
+            </a:r>
+            <a:r>
+              <a:rPr lang="zh-CN" altLang="en-US" b="1">
+                <a:solidFill>
+                  <a:srgbClr val="002060"/>
+                </a:solidFill>
+                <a:latin typeface="微软雅黑" panose="020B0503020204020204" charset="-122"/>
+                <a:ea typeface="微软雅黑" panose="020B0503020204020204" charset="-122"/>
+              </a:rPr>
+              <a:t>组合公钥</a:t>
+            </a:r>
+            <a:r>
+              <a:rPr lang="zh-CN" altLang="en-US">
+                <a:latin typeface="微软雅黑" panose="020B0503020204020204" charset="-122"/>
+                <a:ea typeface="微软雅黑" panose="020B0503020204020204" charset="-122"/>
+              </a:rPr>
+              <a:t>：</a:t>
+            </a:r>
+            <a:r>
+              <a:rPr lang="zh-CN" altLang="en-US"/>
+              <a:t>基于标识的公钥机制，提供数字签名和密钥加密功能，解决标识鉴别难题，鉴别规模可到</a:t>
+            </a:r>
+            <a:r>
+              <a:rPr lang="en-US" altLang="zh-CN"/>
+              <a:t>10</a:t>
+            </a:r>
+            <a:r>
+              <a:rPr lang="en-US" altLang="zh-CN" baseline="30000"/>
+              <a:t>48</a:t>
+            </a:r>
+            <a:endParaRPr lang="en-US" altLang="zh-CN" b="1">
+              <a:solidFill>
+                <a:srgbClr val="002060"/>
+              </a:solidFill>
               <a:latin typeface="微软雅黑" panose="020B0503020204020204" charset="-122"/>
               <a:ea typeface="微软雅黑" panose="020B0503020204020204" charset="-122"/>
             </a:endParaRPr>
           </a:p>
-        </p:txBody>
-      </p:sp>
-      <p:sp>
-        <p:nvSpPr>
-          <p:cNvPr id="3" name="内容占位符 2"/>
-          <p:cNvSpPr>
-            <a:spLocks noGrp="1"/>
-          </p:cNvSpPr>
-          <p:nvPr>
-            <p:ph idx="1"/>
-          </p:nvPr>
-        </p:nvSpPr>
-        <p:spPr/>
-        <p:txBody>
-          <a:bodyPr/>
           <a:p>
             <a:pPr marL="0" indent="0">
               <a:buNone/>
             </a:pPr>
-            <a:endParaRPr lang="zh-CN" altLang="en-US"/>
+            <a:r>
+              <a:rPr lang="en-US" altLang="zh-CN" b="1">
+                <a:solidFill>
+                  <a:srgbClr val="002060"/>
+                </a:solidFill>
+                <a:latin typeface="微软雅黑" panose="020B0503020204020204" charset="-122"/>
+                <a:ea typeface="微软雅黑" panose="020B0503020204020204" charset="-122"/>
+              </a:rPr>
+              <a:t>CPK </a:t>
+            </a:r>
+            <a:r>
+              <a:rPr lang="zh-CN" altLang="en-US" b="1">
+                <a:solidFill>
+                  <a:srgbClr val="002060"/>
+                </a:solidFill>
+                <a:latin typeface="微软雅黑" panose="020B0503020204020204" charset="-122"/>
+                <a:ea typeface="微软雅黑" panose="020B0503020204020204" charset="-122"/>
+              </a:rPr>
+              <a:t>真值逻辑</a:t>
+            </a:r>
+            <a:r>
+              <a:rPr lang="zh-CN" altLang="en-US">
+                <a:latin typeface="微软雅黑" panose="020B0503020204020204" charset="-122"/>
+                <a:ea typeface="微软雅黑" panose="020B0503020204020204" charset="-122"/>
+              </a:rPr>
+              <a:t>：</a:t>
+            </a:r>
+            <a:r>
+              <a:rPr lang="zh-CN" altLang="en-US"/>
+              <a:t>基于证据的真值逻辑，证明物联网实体的真实性，也能证明事联网事件的真实性。</a:t>
+            </a:r>
+            <a:endParaRPr lang="en-US" altLang="zh-CN" b="1">
+              <a:solidFill>
+                <a:srgbClr val="002060"/>
+              </a:solidFill>
+              <a:latin typeface="微软雅黑" panose="020B0503020204020204" charset="-122"/>
+              <a:ea typeface="微软雅黑" panose="020B0503020204020204" charset="-122"/>
+            </a:endParaRPr>
           </a:p>
           <a:p>
             <a:pPr marL="0" indent="0">
               <a:buNone/>
             </a:pPr>
             <a:r>
+              <a:rPr lang="en-US" altLang="zh-CN" b="1">
+                <a:solidFill>
+                  <a:srgbClr val="002060"/>
+                </a:solidFill>
+                <a:latin typeface="微软雅黑" panose="020B0503020204020204" charset="-122"/>
+                <a:ea typeface="微软雅黑" panose="020B0503020204020204" charset="-122"/>
+              </a:rPr>
+              <a:t>CPK </a:t>
+            </a:r>
+            <a:r>
+              <a:rPr lang="zh-CN" altLang="en-US" b="1">
+                <a:solidFill>
+                  <a:srgbClr val="002060"/>
+                </a:solidFill>
+                <a:latin typeface="微软雅黑" panose="020B0503020204020204" charset="-122"/>
+                <a:ea typeface="微软雅黑" panose="020B0503020204020204" charset="-122"/>
+              </a:rPr>
+              <a:t>虚拟网络</a:t>
+            </a:r>
+            <a:r>
+              <a:rPr lang="zh-CN" altLang="en-US">
+                <a:latin typeface="微软雅黑" panose="020B0503020204020204" charset="-122"/>
+                <a:ea typeface="微软雅黑" panose="020B0503020204020204" charset="-122"/>
+              </a:rPr>
+              <a:t>：</a:t>
+            </a:r>
+            <a:r>
               <a:rPr lang="zh-CN" altLang="en-US"/>
-              <a:t>我的安全我做主</a:t>
-            </a:r>
-            <a:endParaRPr lang="zh-CN" altLang="en-US"/>
-          </a:p>
-          <a:p>
-            <a:pPr marL="0" indent="0">
-              <a:buNone/>
-            </a:pPr>
+              <a:t>标识到标识（</a:t>
+            </a:r>
+            <a:r>
+              <a:rPr lang="en-US" altLang="zh-CN"/>
+              <a:t>I to I</a:t>
+            </a:r>
             <a:r>
               <a:rPr lang="zh-CN" altLang="en-US"/>
-              <a:t>自主可控，以主动管理取代被动防御</a:t>
-            </a:r>
-            <a:endParaRPr lang="zh-CN" altLang="en-US"/>
-          </a:p>
-          <a:p>
-            <a:pPr marL="0" indent="0">
-              <a:buNone/>
-            </a:pPr>
-            <a:r>
-              <a:rPr lang="zh-CN" altLang="en-US"/>
-              <a:t>为国家提供网络安全</a:t>
-            </a:r>
-            <a:endParaRPr lang="zh-CN" altLang="en-US"/>
-          </a:p>
-          <a:p>
-            <a:pPr marL="0" indent="0">
-              <a:buNone/>
-            </a:pPr>
-            <a:r>
-              <a:rPr lang="zh-CN" altLang="en-US"/>
-              <a:t>为民众提供交易安全</a:t>
+              <a:t>）的虚拟网络，构建自主可控事联网，解决网际空间信息安全，包括通信、交易、防伪、内核等安全管理。</a:t>
             </a:r>
             <a:endParaRPr lang="zh-CN" altLang="en-US"/>
           </a:p>
@@ -5198,7 +5204,7 @@
                 <a:cs typeface="+mn-cs"/>
                 <a:sym typeface="+mn-ea"/>
               </a:rPr>
-              <a:t>CPK网络形态</a:t>
+              <a:t>CPK虚拟网络</a:t>
             </a:r>
             <a:endParaRPr lang="zh-CN" altLang="en-US" sz="4000" b="1">
               <a:latin typeface="微软雅黑" panose="020B0503020204020204" charset="-122"/>
@@ -5268,7 +5274,7 @@
         </p:nvSpPr>
         <p:spPr>
           <a:xfrm>
-            <a:off x="1551305" y="4086860"/>
+            <a:off x="1668780" y="3769360"/>
             <a:ext cx="979805" cy="500380"/>
           </a:xfrm>
           <a:prstGeom prst="rect">
@@ -5443,14 +5449,15 @@
         <p:nvCxnSpPr>
           <p:cNvPr id="10" name="直接连接符 9"/>
           <p:cNvCxnSpPr>
+            <a:stCxn id="4" idx="2"/>
             <a:endCxn id="6" idx="0"/>
           </p:cNvCxnSpPr>
           <p:nvPr/>
         </p:nvCxnSpPr>
         <p:spPr>
           <a:xfrm>
-            <a:off x="2317115" y="4597400"/>
-            <a:ext cx="331470" cy="586105"/>
+            <a:off x="2159000" y="4269740"/>
+            <a:ext cx="489585" cy="913765"/>
           </a:xfrm>
           <a:prstGeom prst="line">
             <a:avLst/>
@@ -5475,13 +5482,15 @@
       <p:cxnSp>
         <p:nvCxnSpPr>
           <p:cNvPr id="11" name="直接连接符 10"/>
-          <p:cNvCxnSpPr/>
+          <p:cNvCxnSpPr>
+            <a:stCxn id="16" idx="2"/>
+          </p:cNvCxnSpPr>
           <p:nvPr/>
         </p:nvCxnSpPr>
         <p:spPr>
           <a:xfrm flipH="1">
-            <a:off x="9138285" y="4607560"/>
-            <a:ext cx="336550" cy="582295"/>
+            <a:off x="9138285" y="4215765"/>
+            <a:ext cx="490220" cy="974090"/>
           </a:xfrm>
           <a:prstGeom prst="line">
             <a:avLst/>
@@ -5511,7 +5520,7 @@
         </p:nvSpPr>
         <p:spPr>
           <a:xfrm>
-            <a:off x="3808730" y="4417695"/>
+            <a:off x="3808730" y="4032885"/>
             <a:ext cx="3289935" cy="429260"/>
           </a:xfrm>
           <a:prstGeom prst="rect">
@@ -5631,7 +5640,7 @@
         </p:nvSpPr>
         <p:spPr>
           <a:xfrm>
-            <a:off x="4625975" y="3907790"/>
+            <a:off x="4697730" y="3536315"/>
             <a:ext cx="1869440" cy="429260"/>
           </a:xfrm>
           <a:prstGeom prst="rect">
@@ -5683,15 +5692,14 @@
         <p:nvCxnSpPr>
           <p:cNvPr id="15" name="直接箭头连接符 14"/>
           <p:cNvCxnSpPr>
-            <a:stCxn id="4" idx="3"/>
-            <a:endCxn id="5" idx="1"/>
+            <a:endCxn id="16" idx="1"/>
           </p:cNvCxnSpPr>
           <p:nvPr/>
         </p:nvCxnSpPr>
         <p:spPr>
-          <a:xfrm>
-            <a:off x="2531110" y="4337050"/>
-            <a:ext cx="6754495" cy="0"/>
+          <a:xfrm flipV="1">
+            <a:off x="2383790" y="3965575"/>
+            <a:ext cx="6754495" cy="67310"/>
           </a:xfrm>
           <a:prstGeom prst="straightConnector1">
             <a:avLst/>
@@ -5725,7 +5733,7 @@
         </p:nvSpPr>
         <p:spPr>
           <a:xfrm>
-            <a:off x="9285605" y="4019550"/>
+            <a:off x="9138285" y="3715385"/>
             <a:ext cx="979805" cy="500380"/>
           </a:xfrm>
           <a:prstGeom prst="rect">
@@ -5764,6 +5772,62 @@
           </a:p>
         </p:txBody>
       </p:sp>
+      <p:sp>
+        <p:nvSpPr>
+          <p:cNvPr id="5" name="矩形 4"/>
+          <p:cNvSpPr/>
+          <p:nvPr/>
+        </p:nvSpPr>
+        <p:spPr>
+          <a:xfrm>
+            <a:off x="4697730" y="5004435"/>
+            <a:ext cx="1869440" cy="429260"/>
+          </a:xfrm>
+          <a:prstGeom prst="rect">
+            <a:avLst/>
+          </a:prstGeom>
+          <a:ln>
+            <a:noFill/>
+          </a:ln>
+        </p:spPr>
+        <p:style>
+          <a:lnRef idx="2">
+            <a:schemeClr val="dk1"/>
+          </a:lnRef>
+          <a:fillRef idx="1">
+            <a:schemeClr val="lt1"/>
+          </a:fillRef>
+          <a:effectRef idx="0">
+            <a:schemeClr val="dk1"/>
+          </a:effectRef>
+          <a:fontRef idx="minor">
+            <a:schemeClr val="dk1"/>
+          </a:fontRef>
+        </p:style>
+        <p:txBody>
+          <a:bodyPr rtlCol="0" anchor="ctr"/>
+          <a:p>
+            <a:pPr algn="ctr"/>
+            <a:r>
+              <a:rPr lang="zh-CN" altLang="en-US" sz="2400" b="1">
+                <a:solidFill>
+                  <a:srgbClr val="FF0000"/>
+                </a:solidFill>
+                <a:latin typeface="微软雅黑" panose="020B0503020204020204" charset="-122"/>
+                <a:ea typeface="微软雅黑" panose="020B0503020204020204" charset="-122"/>
+              </a:rPr>
+              <a:t>物理连接</a:t>
+            </a:r>
+            <a:endParaRPr lang="zh-CN" altLang="en-US" sz="2400" b="1">
+              <a:solidFill>
+                <a:srgbClr val="FF0000"/>
+              </a:solidFill>
+              <a:latin typeface="微软雅黑" panose="020B0503020204020204" charset="-122"/>
+              <a:ea typeface="微软雅黑" panose="020B0503020204020204" charset="-122"/>
+            </a:endParaRPr>
+          </a:p>
+        </p:txBody>
+      </p:sp>
     </p:spTree>
   </p:cSld>
   <p:clrMapOvr>
@@ -5837,7 +5901,19 @@
             </a:pPr>
             <a:r>
               <a:rPr lang="zh-CN" altLang="en-US"/>
-              <a:t>为网络提供可证链接（防非法接入）</a:t>
+              <a:t>为</a:t>
+            </a:r>
+            <a:r>
+              <a:rPr lang="zh-CN" altLang="en-US" b="1">
+                <a:solidFill>
+                  <a:srgbClr val="FF0000"/>
+                </a:solidFill>
+              </a:rPr>
+              <a:t>网络</a:t>
+            </a:r>
+            <a:r>
+              <a:rPr lang="zh-CN" altLang="en-US"/>
+              <a:t>提供可证链接（防非法接入）</a:t>
             </a:r>
             <a:endParaRPr lang="zh-CN" altLang="en-US"/>
           </a:p>
@@ -5847,7 +5923,19 @@
             </a:pPr>
             <a:r>
               <a:rPr lang="zh-CN" altLang="en-US"/>
-              <a:t>为交易提供可证支付（支付和结账）</a:t>
+              <a:t>为</a:t>
+            </a:r>
+            <a:r>
+              <a:rPr lang="zh-CN" altLang="en-US" b="1">
+                <a:solidFill>
+                  <a:srgbClr val="FF0000"/>
+                </a:solidFill>
+              </a:rPr>
+              <a:t>交易</a:t>
+            </a:r>
+            <a:r>
+              <a:rPr lang="zh-CN" altLang="en-US"/>
+              <a:t>提供可证支付（支付和结账）</a:t>
             </a:r>
             <a:endParaRPr lang="zh-CN" altLang="en-US"/>
           </a:p>
@@ -5857,7 +5945,19 @@
             </a:pPr>
             <a:r>
               <a:rPr lang="zh-CN" altLang="en-US"/>
-              <a:t>为办公提供可证文电</a:t>
+              <a:t>为</a:t>
+            </a:r>
+            <a:r>
+              <a:rPr lang="zh-CN" altLang="en-US" b="1">
+                <a:solidFill>
+                  <a:srgbClr val="FF0000"/>
+                </a:solidFill>
+              </a:rPr>
+              <a:t>办公</a:t>
+            </a:r>
+            <a:r>
+              <a:rPr lang="zh-CN" altLang="en-US"/>
+              <a:t>提供可证文电</a:t>
             </a:r>
             <a:endParaRPr lang="zh-CN" altLang="en-US"/>
           </a:p>
@@ -5867,7 +5967,19 @@
             </a:pPr>
             <a:r>
               <a:rPr lang="zh-CN" altLang="en-US"/>
-              <a:t>为内核提供可证操作（双内核操作）</a:t>
+              <a:t>为</a:t>
+            </a:r>
+            <a:r>
+              <a:rPr lang="zh-CN" altLang="en-US" b="1">
+                <a:solidFill>
+                  <a:srgbClr val="FF0000"/>
+                </a:solidFill>
+              </a:rPr>
+              <a:t>内核</a:t>
+            </a:r>
+            <a:r>
+              <a:rPr lang="zh-CN" altLang="en-US"/>
+              <a:t>提供可证操作（双内核操作）</a:t>
             </a:r>
             <a:endParaRPr lang="zh-CN" altLang="en-US"/>
           </a:p>
@@ -5877,7 +5989,19 @@
             </a:pPr>
             <a:r>
               <a:rPr lang="zh-CN" altLang="en-US"/>
-              <a:t>为防伪提供可证标签</a:t>
+              <a:t>为</a:t>
+            </a:r>
+            <a:r>
+              <a:rPr lang="zh-CN" altLang="en-US" b="1">
+                <a:solidFill>
+                  <a:srgbClr val="FF0000"/>
+                </a:solidFill>
+              </a:rPr>
+              <a:t>防伪</a:t>
+            </a:r>
+            <a:r>
+              <a:rPr lang="zh-CN" altLang="en-US"/>
+              <a:t>提供可证标签</a:t>
             </a:r>
             <a:endParaRPr lang="zh-CN" altLang="en-US"/>
           </a:p>
@@ -5949,7 +6073,26 @@
             </a:pPr>
             <a:r>
               <a:rPr lang="zh-CN" altLang="en-US"/>
-              <a:t>以基于证据的真值逻辑取代基于模型的相信逻辑</a:t>
+              <a:t>以</a:t>
+            </a:r>
+            <a:r>
+              <a:rPr lang="zh-CN" altLang="en-US" b="1">
+                <a:solidFill>
+                  <a:srgbClr val="002060"/>
+                </a:solidFill>
+                <a:effectLst>
+                  <a:outerShdw blurRad="38100" dist="19050" dir="2700000" algn="tl" rotWithShape="0">
+                    <a:schemeClr val="dk1">
+                      <a:alpha val="40000"/>
+                    </a:schemeClr>
+                  </a:outerShdw>
+                </a:effectLst>
+              </a:rPr>
+              <a:t>基于证据</a:t>
+            </a:r>
+            <a:r>
+              <a:rPr lang="zh-CN" altLang="en-US"/>
+              <a:t>的真值逻辑取代基于模型的相信逻辑</a:t>
             </a:r>
             <a:endParaRPr lang="zh-CN" altLang="en-US"/>
           </a:p>
@@ -5959,7 +6102,26 @@
             </a:pPr>
             <a:r>
               <a:rPr lang="zh-CN" altLang="en-US"/>
-              <a:t>以鉴别的客观性取代认证的主观性</a:t>
+              <a:t>以</a:t>
+            </a:r>
+            <a:r>
+              <a:rPr lang="zh-CN" altLang="en-US" b="1">
+                <a:solidFill>
+                  <a:srgbClr val="002060"/>
+                </a:solidFill>
+                <a:effectLst>
+                  <a:outerShdw blurRad="38100" dist="19050" dir="2700000" algn="tl" rotWithShape="0">
+                    <a:schemeClr val="dk1">
+                      <a:alpha val="40000"/>
+                    </a:schemeClr>
+                  </a:outerShdw>
+                </a:effectLst>
+              </a:rPr>
+              <a:t>鉴别的客观性</a:t>
+            </a:r>
+            <a:r>
+              <a:rPr lang="zh-CN" altLang="en-US"/>
+              <a:t>取代认证的主观性</a:t>
             </a:r>
             <a:endParaRPr lang="zh-CN" altLang="en-US"/>
           </a:p>
@@ -5969,7 +6131,26 @@
             </a:pPr>
             <a:r>
               <a:rPr lang="zh-CN" altLang="en-US"/>
-              <a:t>以证明链取代信任链</a:t>
+              <a:t>以</a:t>
+            </a:r>
+            <a:r>
+              <a:rPr lang="zh-CN" altLang="en-US" b="1">
+                <a:solidFill>
+                  <a:srgbClr val="002060"/>
+                </a:solidFill>
+                <a:effectLst>
+                  <a:outerShdw blurRad="38100" dist="19050" dir="2700000" algn="tl" rotWithShape="0">
+                    <a:schemeClr val="dk1">
+                      <a:alpha val="40000"/>
+                    </a:schemeClr>
+                  </a:outerShdw>
+                </a:effectLst>
+              </a:rPr>
+              <a:t>证据链</a:t>
+            </a:r>
+            <a:r>
+              <a:rPr lang="zh-CN" altLang="en-US"/>
+              <a:t>取代信任链</a:t>
             </a:r>
             <a:endParaRPr lang="zh-CN" altLang="en-US"/>
           </a:p>
@@ -5979,7 +6160,26 @@
             </a:pPr>
             <a:r>
               <a:rPr lang="zh-CN" altLang="en-US"/>
-              <a:t>以当场鉴别取代登录机制，阻断信任转移</a:t>
+              <a:t>以</a:t>
+            </a:r>
+            <a:r>
+              <a:rPr lang="zh-CN" altLang="en-US" b="1">
+                <a:solidFill>
+                  <a:srgbClr val="002060"/>
+                </a:solidFill>
+                <a:effectLst>
+                  <a:outerShdw blurRad="38100" dist="19050" dir="2700000" algn="tl" rotWithShape="0">
+                    <a:schemeClr val="dk1">
+                      <a:alpha val="40000"/>
+                    </a:schemeClr>
+                  </a:outerShdw>
+                </a:effectLst>
+              </a:rPr>
+              <a:t>当场鉴别</a:t>
+            </a:r>
+            <a:r>
+              <a:rPr lang="zh-CN" altLang="en-US"/>
+              <a:t>取代登录机制，阻断信任转移</a:t>
             </a:r>
             <a:endParaRPr lang="zh-CN" altLang="en-US"/>
           </a:p>
@@ -5989,7 +6189,26 @@
             </a:pPr>
             <a:r>
               <a:rPr lang="zh-CN" altLang="en-US"/>
-              <a:t>以接入协议取代口令认证，防止非法接入</a:t>
+              <a:t>以</a:t>
+            </a:r>
+            <a:r>
+              <a:rPr lang="zh-CN" altLang="en-US" b="1">
+                <a:solidFill>
+                  <a:srgbClr val="002060"/>
+                </a:solidFill>
+                <a:effectLst>
+                  <a:outerShdw blurRad="38100" dist="19050" dir="2700000" algn="tl" rotWithShape="0">
+                    <a:schemeClr val="dk1">
+                      <a:alpha val="40000"/>
+                    </a:schemeClr>
+                  </a:outerShdw>
+                </a:effectLst>
+              </a:rPr>
+              <a:t>签名协议</a:t>
+            </a:r>
+            <a:r>
+              <a:rPr lang="zh-CN" altLang="en-US"/>
+              <a:t>取代口令认证，防止非法接入</a:t>
             </a:r>
             <a:endParaRPr lang="zh-CN" altLang="en-US"/>
           </a:p>
@@ -5999,7 +6218,26 @@
             </a:pPr>
             <a:r>
               <a:rPr lang="zh-CN" altLang="en-US"/>
-              <a:t>以里、外鉴别实现实体鉴别（本体和标识）</a:t>
+              <a:t>以</a:t>
+            </a:r>
+            <a:r>
+              <a:rPr lang="zh-CN" altLang="en-US" b="1">
+                <a:solidFill>
+                  <a:srgbClr val="002060"/>
+                </a:solidFill>
+                <a:effectLst>
+                  <a:outerShdw blurRad="38100" dist="19050" dir="2700000" algn="tl" rotWithShape="0">
+                    <a:schemeClr val="dk1">
+                      <a:alpha val="40000"/>
+                    </a:schemeClr>
+                  </a:outerShdw>
+                </a:effectLst>
+              </a:rPr>
+              <a:t>里、外鉴别</a:t>
+            </a:r>
+            <a:r>
+              <a:rPr lang="zh-CN" altLang="en-US"/>
+              <a:t>实现实体鉴别（本体和标识）</a:t>
             </a:r>
             <a:endParaRPr lang="zh-CN" altLang="en-US"/>
           </a:p>
@@ -6009,7 +6247,26 @@
             </a:pPr>
             <a:r>
               <a:rPr lang="zh-CN" altLang="en-US"/>
-              <a:t>以前、后鉴别实现事件鉴别（事前与事后）</a:t>
+              <a:t>以</a:t>
+            </a:r>
+            <a:r>
+              <a:rPr lang="zh-CN" altLang="en-US" b="1">
+                <a:solidFill>
+                  <a:srgbClr val="002060"/>
+                </a:solidFill>
+                <a:effectLst>
+                  <a:outerShdw blurRad="38100" dist="19050" dir="2700000" algn="tl" rotWithShape="0">
+                    <a:schemeClr val="dk1">
+                      <a:alpha val="40000"/>
+                    </a:schemeClr>
+                  </a:outerShdw>
+                </a:effectLst>
+              </a:rPr>
+              <a:t>前、后鉴别</a:t>
+            </a:r>
+            <a:r>
+              <a:rPr lang="zh-CN" altLang="en-US"/>
+              <a:t>实现事件鉴别（事前与事后）</a:t>
             </a:r>
             <a:endParaRPr lang="zh-CN" altLang="en-US"/>
           </a:p>
@@ -6050,6 +6307,9 @@
             <a:pPr algn="l"/>
             <a:r>
               <a:rPr lang="en-US" altLang="zh-CN" sz="4000" b="1">
+                <a:solidFill>
+                  <a:srgbClr val="002060"/>
+                </a:solidFill>
                 <a:latin typeface="Microsoft YaHei UI" panose="020B0503020204020204" charset="-122"/>
                 <a:ea typeface="Microsoft YaHei UI" panose="020B0503020204020204" charset="-122"/>
               </a:rPr>
@@ -6057,12 +6317,18 @@
             </a:r>
             <a:r>
               <a:rPr lang="zh-CN" altLang="en-US" sz="4000" b="1">
+                <a:solidFill>
+                  <a:srgbClr val="002060"/>
+                </a:solidFill>
                 <a:latin typeface="Microsoft YaHei UI" panose="020B0503020204020204" charset="-122"/>
                 <a:ea typeface="Microsoft YaHei UI" panose="020B0503020204020204" charset="-122"/>
               </a:rPr>
-              <a:t>基本技术</a:t>
+              <a:t>服务模式</a:t>
             </a:r>
             <a:endParaRPr lang="zh-CN" altLang="en-US" sz="4000" b="1">
+              <a:solidFill>
+                <a:srgbClr val="002060"/>
+              </a:solidFill>
               <a:latin typeface="Microsoft YaHei UI" panose="020B0503020204020204" charset="-122"/>
               <a:ea typeface="Microsoft YaHei UI" panose="020B0503020204020204" charset="-122"/>
             </a:endParaRPr>
@@ -6082,52 +6348,63 @@
         <p:spPr>
           <a:xfrm>
             <a:off x="838200" y="1825625"/>
-            <a:ext cx="10616565" cy="4351655"/>
+            <a:ext cx="10515600" cy="4735830"/>
           </a:xfrm>
         </p:spPr>
         <p:txBody>
-          <a:bodyPr>
-            <a:normAutofit fontScale="90000"/>
-          </a:bodyPr>
+          <a:bodyPr/>
           <a:p>
             <a:pPr marL="0" indent="0">
               <a:buNone/>
             </a:pPr>
             <a:r>
-              <a:rPr lang="en-US" altLang="zh-CN">
+              <a:rPr lang="en-US" altLang="zh-CN" b="1">
                 <a:latin typeface="微软雅黑" panose="020B0503020204020204" charset="-122"/>
                 <a:ea typeface="微软雅黑" panose="020B0503020204020204" charset="-122"/>
               </a:rPr>
-              <a:t>1. </a:t>
+              <a:t>       CPK-chip:  </a:t>
+            </a:r>
+            <a:r>
+              <a:rPr lang="zh-CN" altLang="en-US">
+                <a:sym typeface="+mn-ea"/>
+              </a:rPr>
+              <a:t>网购，自动安装  （节省系统开销）</a:t>
+            </a:r>
+            <a:endParaRPr lang="zh-CN" altLang="en-US">
+              <a:sym typeface="+mn-ea"/>
+            </a:endParaRPr>
+          </a:p>
+          <a:p>
+            <a:pPr marL="0" indent="0">
+              <a:buNone/>
+            </a:pPr>
+            <a:r>
+              <a:rPr lang="zh-CN" altLang="en-US">
+                <a:sym typeface="+mn-ea"/>
+              </a:rPr>
+              <a:t>         </a:t>
             </a:r>
             <a:r>
               <a:rPr lang="en-US" altLang="zh-CN" b="1">
-                <a:solidFill>
-                  <a:srgbClr val="002060"/>
-                </a:solidFill>
                 <a:latin typeface="微软雅黑" panose="020B0503020204020204" charset="-122"/>
                 <a:ea typeface="微软雅黑" panose="020B0503020204020204" charset="-122"/>
               </a:rPr>
-              <a:t>CPK </a:t>
+              <a:t>CPK-soft</a:t>
             </a:r>
             <a:r>
               <a:rPr lang="zh-CN" altLang="en-US" b="1">
-                <a:solidFill>
-                  <a:srgbClr val="002060"/>
-                </a:solidFill>
                 <a:latin typeface="微软雅黑" panose="020B0503020204020204" charset="-122"/>
                 <a:ea typeface="微软雅黑" panose="020B0503020204020204" charset="-122"/>
               </a:rPr>
-              <a:t>组合公钥</a:t>
+              <a:t>：</a:t>
             </a:r>
             <a:r>
               <a:rPr lang="zh-CN" altLang="en-US">
-                <a:latin typeface="微软雅黑" panose="020B0503020204020204" charset="-122"/>
-                <a:ea typeface="微软雅黑" panose="020B0503020204020204" charset="-122"/>
-              </a:rPr>
-              <a:t>：</a:t>
-            </a:r>
-            <a:endParaRPr lang="zh-CN" altLang="en-US">
+                <a:sym typeface="+mn-ea"/>
+              </a:rPr>
+              <a:t>下载，自动安装</a:t>
+            </a:r>
+            <a:endParaRPr lang="zh-CN" altLang="en-US" b="1">
               <a:latin typeface="微软雅黑" panose="020B0503020204020204" charset="-122"/>
               <a:ea typeface="微软雅黑" panose="020B0503020204020204" charset="-122"/>
             </a:endParaRPr>
@@ -6137,138 +6414,222 @@
               <a:buNone/>
             </a:pPr>
             <a:r>
-              <a:rPr lang="zh-CN" altLang="en-US"/>
-              <a:t>     基于标识的公钥机制，提供数字签名和密钥加密功能，解决标识鉴别难</a:t>
-            </a:r>
-            <a:endParaRPr lang="zh-CN" altLang="en-US"/>
-          </a:p>
-          <a:p>
-            <a:pPr marL="0" indent="0">
-              <a:buNone/>
-            </a:pPr>
-            <a:r>
-              <a:rPr lang="zh-CN" altLang="en-US"/>
-              <a:t>题，鉴别规模可到</a:t>
-            </a:r>
-            <a:r>
-              <a:rPr lang="en-US" altLang="zh-CN"/>
-              <a:t>10</a:t>
-            </a:r>
-            <a:r>
-              <a:rPr lang="en-US" altLang="zh-CN" baseline="30000"/>
-              <a:t>48</a:t>
-            </a:r>
-            <a:endParaRPr lang="en-US" altLang="zh-CN" baseline="30000"/>
-          </a:p>
-          <a:p>
-            <a:pPr marL="0" indent="0">
-              <a:buNone/>
-            </a:pPr>
-            <a:r>
-              <a:rPr lang="en-US" altLang="zh-CN" b="1">
-                <a:solidFill>
-                  <a:srgbClr val="002060"/>
-                </a:solidFill>
+              <a:rPr lang="zh-CN" altLang="en-US" b="1">
                 <a:latin typeface="微软雅黑" panose="020B0503020204020204" charset="-122"/>
                 <a:ea typeface="微软雅黑" panose="020B0503020204020204" charset="-122"/>
               </a:rPr>
-              <a:t>2. CPK </a:t>
+              <a:t>       密钥长度</a:t>
+            </a:r>
+            <a:r>
+              <a:rPr lang="zh-CN" altLang="en-US"/>
+              <a:t>：</a:t>
+            </a:r>
+            <a:r>
+              <a:rPr lang="en-US" altLang="zh-CN"/>
+              <a:t>64b(</a:t>
+            </a:r>
+            <a:r>
+              <a:rPr lang="zh-CN" altLang="en-US"/>
+              <a:t>防伪</a:t>
+            </a:r>
+            <a:r>
+              <a:rPr lang="en-US" altLang="zh-CN"/>
+              <a:t>/</a:t>
+            </a:r>
+            <a:r>
+              <a:rPr lang="zh-CN" altLang="en-US"/>
+              <a:t>软件</a:t>
+            </a:r>
+            <a:r>
+              <a:rPr lang="en-US" altLang="zh-CN"/>
+              <a:t>)</a:t>
+            </a:r>
+            <a:r>
+              <a:rPr lang="zh-CN" altLang="en-US"/>
+              <a:t>，</a:t>
+            </a:r>
+            <a:r>
+              <a:rPr lang="en-US" altLang="zh-CN"/>
+              <a:t>112b(</a:t>
+            </a:r>
+            <a:r>
+              <a:rPr lang="zh-CN" altLang="en-US"/>
+              <a:t>通信</a:t>
+            </a:r>
+            <a:r>
+              <a:rPr lang="en-US" altLang="zh-CN"/>
+              <a:t>/</a:t>
+            </a:r>
+            <a:r>
+              <a:rPr lang="zh-CN" altLang="en-US"/>
+              <a:t>支付</a:t>
+            </a:r>
+            <a:r>
+              <a:rPr lang="en-US" altLang="zh-CN"/>
+              <a:t>)</a:t>
+            </a:r>
+            <a:r>
+              <a:rPr lang="zh-CN" altLang="en-US"/>
+              <a:t>，</a:t>
+            </a:r>
+            <a:r>
+              <a:rPr lang="en-US" altLang="zh-CN"/>
+              <a:t>160b (</a:t>
+            </a:r>
+            <a:r>
+              <a:rPr lang="zh-CN" altLang="en-US"/>
+              <a:t>办公</a:t>
+            </a:r>
+            <a:r>
+              <a:rPr lang="en-US" altLang="zh-CN"/>
+              <a:t>)</a:t>
+            </a:r>
+            <a:endParaRPr lang="zh-CN" altLang="en-US"/>
+          </a:p>
+          <a:p>
+            <a:pPr marL="0" indent="0">
+              <a:buNone/>
+            </a:pPr>
+            <a:r>
+              <a:rPr lang="en-US" altLang="zh-CN"/>
+              <a:t>         </a:t>
             </a:r>
             <a:r>
               <a:rPr lang="zh-CN" altLang="en-US" b="1">
-                <a:solidFill>
-                  <a:srgbClr val="002060"/>
-                </a:solidFill>
                 <a:latin typeface="微软雅黑" panose="020B0503020204020204" charset="-122"/>
                 <a:ea typeface="微软雅黑" panose="020B0503020204020204" charset="-122"/>
               </a:rPr>
-              <a:t>真值逻辑</a:t>
-            </a:r>
-            <a:r>
-              <a:rPr lang="zh-CN" altLang="en-US">
+              <a:t>签名长度</a:t>
+            </a:r>
+            <a:r>
+              <a:rPr lang="zh-CN" altLang="en-US"/>
+              <a:t>：</a:t>
+            </a:r>
+            <a:r>
+              <a:rPr lang="en-US" altLang="zh-CN"/>
+              <a:t>12B</a:t>
+            </a:r>
+            <a:r>
+              <a:rPr lang="zh-CN" altLang="en-US"/>
+              <a:t>，</a:t>
+            </a:r>
+            <a:r>
+              <a:rPr lang="en-US" altLang="zh-CN"/>
+              <a:t>19B</a:t>
+            </a:r>
+            <a:r>
+              <a:rPr lang="zh-CN" altLang="en-US"/>
+              <a:t>，</a:t>
+            </a:r>
+            <a:r>
+              <a:rPr lang="en-US" altLang="zh-CN"/>
+              <a:t>25B</a:t>
+            </a:r>
+            <a:r>
+              <a:rPr lang="zh-CN" altLang="en-US"/>
+              <a:t>                     </a:t>
+            </a:r>
+            <a:endParaRPr lang="en-US" altLang="zh-CN"/>
+          </a:p>
+          <a:p>
+            <a:pPr marL="0" indent="0">
+              <a:buNone/>
+            </a:pPr>
+            <a:r>
+              <a:rPr lang="zh-CN" altLang="en-US"/>
+              <a:t>        </a:t>
+            </a:r>
+            <a:r>
+              <a:rPr lang="zh-CN" altLang="en-US" b="1">
                 <a:latin typeface="微软雅黑" panose="020B0503020204020204" charset="-122"/>
                 <a:ea typeface="微软雅黑" panose="020B0503020204020204" charset="-122"/>
               </a:rPr>
-              <a:t>：</a:t>
-            </a:r>
-            <a:endParaRPr lang="zh-CN" altLang="en-US">
-              <a:latin typeface="微软雅黑" panose="020B0503020204020204" charset="-122"/>
-              <a:ea typeface="微软雅黑" panose="020B0503020204020204" charset="-122"/>
-            </a:endParaRPr>
-          </a:p>
-          <a:p>
-            <a:pPr marL="0" indent="0">
-              <a:buNone/>
-            </a:pPr>
-            <a:r>
-              <a:rPr lang="zh-CN" altLang="en-US"/>
-              <a:t>     基于证据的真值逻辑，证明物联网实体的真实性，也能证明事联网事件的真实性。</a:t>
-            </a:r>
-            <a:endParaRPr lang="zh-CN" altLang="en-US"/>
-          </a:p>
-          <a:p>
-            <a:pPr marL="0" indent="0">
-              <a:buNone/>
-            </a:pPr>
-            <a:r>
-              <a:rPr lang="en-US" altLang="zh-CN" b="1">
-                <a:solidFill>
-                  <a:srgbClr val="002060"/>
-                </a:solidFill>
+              <a:t> </a:t>
+            </a:r>
+            <a:r>
+              <a:rPr lang="zh-CN" altLang="en-US" b="1">
                 <a:latin typeface="微软雅黑" panose="020B0503020204020204" charset="-122"/>
                 <a:ea typeface="微软雅黑" panose="020B0503020204020204" charset="-122"/>
-              </a:rPr>
-              <a:t>3. CPK </a:t>
+                <a:sym typeface="+mn-ea"/>
+              </a:rPr>
+              <a:t>密钥管理</a:t>
+            </a:r>
+            <a:r>
+              <a:rPr lang="zh-CN" altLang="en-US">
+                <a:sym typeface="+mn-ea"/>
+              </a:rPr>
+              <a:t>：网上申请，网上分发，自动安装</a:t>
+            </a:r>
+            <a:endParaRPr lang="en-US" altLang="zh-CN">
+              <a:sym typeface="+mn-ea"/>
+            </a:endParaRPr>
+          </a:p>
+          <a:p>
+            <a:pPr marL="0" indent="0">
+              <a:buNone/>
+            </a:pPr>
+            <a:r>
+              <a:rPr lang="zh-CN" altLang="en-US"/>
+              <a:t>     </a:t>
             </a:r>
             <a:r>
               <a:rPr lang="zh-CN" altLang="en-US" b="1">
-                <a:solidFill>
-                  <a:srgbClr val="002060"/>
-                </a:solidFill>
                 <a:latin typeface="微软雅黑" panose="020B0503020204020204" charset="-122"/>
                 <a:ea typeface="微软雅黑" panose="020B0503020204020204" charset="-122"/>
               </a:rPr>
-              <a:t>虚拟网络</a:t>
-            </a:r>
-            <a:r>
-              <a:rPr lang="zh-CN" altLang="en-US">
+              <a:t>   免费使用</a:t>
+            </a:r>
+            <a:r>
+              <a:rPr lang="zh-CN" altLang="en-US"/>
+              <a:t>：数据加密，防伪验证</a:t>
+            </a:r>
+            <a:endParaRPr lang="zh-CN" altLang="en-US"/>
+          </a:p>
+          <a:p>
+            <a:pPr marL="0" indent="0">
+              <a:buNone/>
+            </a:pPr>
+            <a:r>
+              <a:rPr lang="zh-CN" altLang="en-US"/>
+              <a:t>         </a:t>
+            </a:r>
+            <a:r>
+              <a:rPr lang="zh-CN" altLang="en-US" b="1">
                 <a:latin typeface="微软雅黑" panose="020B0503020204020204" charset="-122"/>
                 <a:ea typeface="微软雅黑" panose="020B0503020204020204" charset="-122"/>
               </a:rPr>
+              <a:t>支持系统</a:t>
+            </a:r>
+            <a:r>
+              <a:rPr lang="zh-CN" altLang="en-US"/>
               <a:t>：</a:t>
             </a:r>
-            <a:endParaRPr lang="zh-CN" altLang="en-US">
-              <a:latin typeface="微软雅黑" panose="020B0503020204020204" charset="-122"/>
-              <a:ea typeface="微软雅黑" panose="020B0503020204020204" charset="-122"/>
-            </a:endParaRPr>
+            <a:r>
+              <a:rPr lang="en-US" altLang="zh-CN" sz="2400" b="1"/>
+              <a:t>Windows </a:t>
+            </a:r>
+            <a:r>
+              <a:rPr lang="zh-CN" altLang="en-US" sz="2400"/>
+              <a:t> </a:t>
+            </a:r>
+            <a:r>
+              <a:rPr lang="en-US" altLang="zh-CN" sz="2400" b="1"/>
+              <a:t>Android</a:t>
+            </a:r>
+            <a:endParaRPr lang="en-US" altLang="zh-CN" sz="2400" b="1"/>
           </a:p>
           <a:p>
             <a:pPr marL="0" indent="0">
+              <a:lnSpc>
+                <a:spcPct val="100000"/>
+              </a:lnSpc>
               <a:buNone/>
             </a:pPr>
             <a:r>
               <a:rPr lang="zh-CN" altLang="en-US"/>
-              <a:t>     标识到标识（</a:t>
-            </a:r>
-            <a:r>
-              <a:rPr lang="en-US" altLang="zh-CN"/>
-              <a:t>I to I</a:t>
-            </a:r>
-            <a:r>
-              <a:rPr lang="zh-CN" altLang="en-US"/>
-              <a:t>）的虚拟网络，构建自主可控事联网，解决网际空间</a:t>
-            </a:r>
-            <a:endParaRPr lang="zh-CN" altLang="en-US"/>
-          </a:p>
-          <a:p>
-            <a:pPr marL="0" indent="0">
-              <a:buNone/>
-            </a:pPr>
-            <a:r>
-              <a:rPr lang="zh-CN" altLang="en-US"/>
-              <a:t>信息安全，包括通信、交易、防伪、内核等安全管理。</a:t>
-            </a:r>
-            <a:endParaRPr lang="zh-CN" altLang="en-US"/>
+              <a:t>         </a:t>
+            </a:r>
+            <a:endParaRPr lang="en-US" altLang="zh-CN"/>
           </a:p>
         </p:txBody>
       </p:sp>
@@ -6306,7 +6667,7 @@
           <a:p>
             <a:pPr algn="l"/>
             <a:r>
-              <a:rPr lang="en-US" altLang="zh-CN" sz="4000" b="1">
+              <a:rPr lang="en-US" altLang="zh-CN" b="1">
                 <a:solidFill>
                   <a:srgbClr val="002060"/>
                 </a:solidFill>
@@ -6316,16 +6677,16 @@
               <a:t>CPK</a:t>
             </a:r>
             <a:r>
-              <a:rPr lang="zh-CN" altLang="en-US" sz="4000" b="1">
+              <a:rPr lang="zh-CN" altLang="en-US" b="1">
                 <a:solidFill>
                   <a:srgbClr val="002060"/>
                 </a:solidFill>
                 <a:latin typeface="Microsoft YaHei UI" panose="020B0503020204020204" charset="-122"/>
                 <a:ea typeface="Microsoft YaHei UI" panose="020B0503020204020204" charset="-122"/>
               </a:rPr>
-              <a:t>基础产品</a:t>
-            </a:r>
-            <a:endParaRPr lang="zh-CN" altLang="en-US" sz="4000" b="1">
+              <a:t>主要应用</a:t>
+            </a:r>
+            <a:endParaRPr lang="zh-CN" altLang="en-US" b="1">
               <a:solidFill>
                 <a:srgbClr val="002060"/>
               </a:solidFill>
@@ -6348,7 +6709,7 @@
         <p:spPr>
           <a:xfrm>
             <a:off x="838200" y="1825625"/>
-            <a:ext cx="10515600" cy="4735830"/>
+            <a:ext cx="10515600" cy="3841750"/>
           </a:xfrm>
         </p:spPr>
         <p:txBody>
@@ -6358,36 +6719,60 @@
               <a:buNone/>
             </a:pPr>
             <a:r>
-              <a:rPr lang="en-US" altLang="zh-CN" b="1">
-                <a:latin typeface="微软雅黑" panose="020B0503020204020204" charset="-122"/>
-                <a:ea typeface="微软雅黑" panose="020B0503020204020204" charset="-122"/>
-              </a:rPr>
-              <a:t>       CPK-chip</a:t>
-            </a:r>
-            <a:r>
               <a:rPr lang="zh-CN" altLang="en-US" b="1">
-                <a:latin typeface="微软雅黑" panose="020B0503020204020204" charset="-122"/>
-                <a:ea typeface="微软雅黑" panose="020B0503020204020204" charset="-122"/>
-              </a:rPr>
-              <a:t>和</a:t>
-            </a:r>
-            <a:r>
-              <a:rPr lang="en-US" altLang="zh-CN" b="1">
-                <a:latin typeface="微软雅黑" panose="020B0503020204020204" charset="-122"/>
-                <a:ea typeface="微软雅黑" panose="020B0503020204020204" charset="-122"/>
-              </a:rPr>
-              <a:t>CPK-soft</a:t>
-            </a:r>
+                <a:solidFill>
+                  <a:srgbClr val="002060"/>
+                </a:solidFill>
+                <a:latin typeface="Microsoft YaHei UI" panose="020B0503020204020204" charset="-122"/>
+                <a:ea typeface="Microsoft YaHei UI" panose="020B0503020204020204" charset="-122"/>
+              </a:rPr>
+              <a:t>可证链接：</a:t>
+            </a:r>
+            <a:r>
+              <a:rPr lang="zh-CN" altLang="en-US" sz="2400"/>
+              <a:t>因特网</a:t>
+            </a:r>
+            <a:r>
+              <a:rPr lang="en-US" altLang="zh-CN" sz="2400"/>
+              <a:t>(IP)</a:t>
+            </a:r>
+            <a:r>
+              <a:rPr lang="zh-CN" altLang="en-US" sz="2400"/>
+              <a:t>、移动网、物联网、事联网等可证链接</a:t>
+            </a:r>
+            <a:endParaRPr lang="zh-CN" altLang="en-US" sz="2400"/>
+          </a:p>
+          <a:p>
+            <a:pPr marL="0" indent="0">
+              <a:buNone/>
+            </a:pPr>
             <a:r>
               <a:rPr lang="zh-CN" altLang="en-US" b="1">
-                <a:latin typeface="微软雅黑" panose="020B0503020204020204" charset="-122"/>
-                <a:ea typeface="微软雅黑" panose="020B0503020204020204" charset="-122"/>
-              </a:rPr>
-              <a:t>可选：</a:t>
-            </a:r>
-            <a:endParaRPr lang="zh-CN" altLang="en-US" b="1">
-              <a:latin typeface="微软雅黑" panose="020B0503020204020204" charset="-122"/>
-              <a:ea typeface="微软雅黑" panose="020B0503020204020204" charset="-122"/>
+                <a:solidFill>
+                  <a:srgbClr val="002060"/>
+                </a:solidFill>
+                <a:latin typeface="Microsoft YaHei UI" panose="020B0503020204020204" charset="-122"/>
+                <a:ea typeface="Microsoft YaHei UI" panose="020B0503020204020204" charset="-122"/>
+                <a:sym typeface="+mn-ea"/>
+              </a:rPr>
+              <a:t>防伪标签：</a:t>
+            </a:r>
+            <a:r>
+              <a:rPr lang="zh-CN" altLang="en-US" sz="2400">
+                <a:solidFill>
+                  <a:schemeClr val="tx1"/>
+                </a:solidFill>
+                <a:latin typeface="+mn-ea"/>
+                <a:sym typeface="+mn-ea"/>
+              </a:rPr>
+              <a:t>纵向证明链和横向证明链</a:t>
+            </a:r>
+            <a:endParaRPr lang="zh-CN" altLang="en-US" sz="2400">
+              <a:solidFill>
+                <a:schemeClr val="tx1"/>
+              </a:solidFill>
+              <a:latin typeface="+mn-ea"/>
+              <a:sym typeface="+mn-ea"/>
             </a:endParaRPr>
           </a:p>
           <a:p>
@@ -6396,137 +6781,93 @@
             </a:pPr>
             <a:r>
               <a:rPr lang="zh-CN" altLang="en-US" b="1">
-                <a:latin typeface="微软雅黑" panose="020B0503020204020204" charset="-122"/>
-                <a:ea typeface="微软雅黑" panose="020B0503020204020204" charset="-122"/>
-              </a:rPr>
-              <a:t>       </a:t>
+                <a:solidFill>
+                  <a:srgbClr val="002060"/>
+                </a:solidFill>
+                <a:latin typeface="Microsoft YaHei UI" panose="020B0503020204020204" charset="-122"/>
+                <a:ea typeface="Microsoft YaHei UI" panose="020B0503020204020204" charset="-122"/>
+              </a:rPr>
+              <a:t>双核计算：</a:t>
+            </a:r>
+            <a:r>
+              <a:rPr lang="zh-CN" altLang="en-US" sz="2400">
+                <a:latin typeface="+mn-ea"/>
+              </a:rPr>
+              <a:t>原内核继续管理软件的正常运行；</a:t>
+            </a:r>
+            <a:endParaRPr lang="zh-CN" altLang="en-US" sz="2400">
+              <a:latin typeface="+mn-ea"/>
+            </a:endParaRPr>
+          </a:p>
+          <a:p>
+            <a:pPr marL="0" indent="0">
+              <a:buNone/>
+            </a:pPr>
+            <a:r>
+              <a:rPr lang="zh-CN" altLang="en-US" sz="2400">
+                <a:latin typeface="+mn-ea"/>
+              </a:rPr>
+              <a:t>            </a:t>
+            </a:r>
+            <a:r>
+              <a:rPr lang="en-US" altLang="zh-CN" sz="2400">
+                <a:latin typeface="+mn-ea"/>
+              </a:rPr>
+              <a:t>CPK</a:t>
+            </a:r>
+            <a:r>
+              <a:rPr lang="zh-CN" altLang="en-US" sz="2400">
+                <a:latin typeface="+mn-ea"/>
+              </a:rPr>
+              <a:t>内核管理软件的真伪；</a:t>
+            </a:r>
+            <a:endParaRPr lang="zh-CN" altLang="en-US" sz="2400">
+              <a:latin typeface="+mn-ea"/>
+            </a:endParaRPr>
+          </a:p>
+          <a:p>
+            <a:pPr marL="0" indent="0">
+              <a:buNone/>
+            </a:pPr>
+            <a:r>
+              <a:rPr lang="zh-CN" altLang="en-US" b="1">
+                <a:solidFill>
+                  <a:srgbClr val="002060"/>
+                </a:solidFill>
+                <a:latin typeface="Microsoft YaHei UI" panose="020B0503020204020204" charset="-122"/>
+                <a:ea typeface="Microsoft YaHei UI" panose="020B0503020204020204" charset="-122"/>
+              </a:rPr>
+              <a:t>数字户币：</a:t>
+            </a:r>
+            <a:r>
+              <a:rPr lang="zh-CN" altLang="en-US" sz="2400"/>
+              <a:t>数字户币在市面流通和网络流通；</a:t>
+            </a:r>
+            <a:endParaRPr lang="zh-CN" altLang="en-US" sz="2400"/>
+          </a:p>
+          <a:p>
+            <a:pPr marL="0" indent="0">
+              <a:buNone/>
+            </a:pPr>
+            <a:r>
+              <a:rPr lang="zh-CN" altLang="en-US" sz="2400"/>
+              <a:t>                          </a:t>
+            </a:r>
+            <a:r>
+              <a:rPr lang="zh-CN" altLang="en-US" sz="2400">
+                <a:sym typeface="+mn-ea"/>
+              </a:rPr>
+              <a:t>数字户币</a:t>
+            </a:r>
+            <a:r>
+              <a:rPr lang="zh-CN" altLang="en-US" sz="2400"/>
+              <a:t>不怕被窃、不怕遗失 </a:t>
             </a:r>
             <a:r>
               <a:rPr lang="zh-CN" altLang="en-US"/>
-              <a:t>密钥长度：</a:t>
-            </a:r>
-            <a:r>
-              <a:rPr lang="en-US" altLang="zh-CN"/>
-              <a:t>64--256</a:t>
-            </a:r>
-            <a:r>
-              <a:rPr lang="zh-CN" altLang="en-US"/>
-              <a:t>可选</a:t>
-            </a:r>
-            <a:endParaRPr lang="en-US" altLang="zh-CN"/>
-          </a:p>
-          <a:p>
-            <a:pPr marL="0" indent="0">
-              <a:buNone/>
-            </a:pPr>
-            <a:r>
-              <a:rPr lang="en-US" altLang="zh-CN"/>
-              <a:t>         </a:t>
-            </a:r>
-            <a:r>
-              <a:rPr lang="zh-CN" altLang="en-US"/>
-              <a:t>签名长度：</a:t>
-            </a:r>
-            <a:r>
-              <a:rPr lang="en-US" altLang="zh-CN"/>
-              <a:t>12B--37B</a:t>
-            </a:r>
-            <a:endParaRPr lang="zh-CN" altLang="en-US"/>
-          </a:p>
-          <a:p>
-            <a:pPr marL="0" indent="0">
-              <a:buNone/>
-            </a:pPr>
-            <a:r>
-              <a:rPr lang="zh-CN" altLang="en-US"/>
-              <a:t>         </a:t>
-            </a:r>
-            <a:r>
-              <a:rPr lang="en-US" altLang="zh-CN"/>
-              <a:t>CPK-chip</a:t>
-            </a:r>
-            <a:r>
-              <a:rPr lang="zh-CN" altLang="en-US"/>
-              <a:t>和</a:t>
-            </a:r>
-            <a:r>
-              <a:rPr lang="en-US" altLang="zh-CN"/>
-              <a:t>CPK-soft</a:t>
-            </a:r>
-            <a:r>
-              <a:rPr lang="zh-CN" altLang="en-US"/>
-              <a:t>互相兼容</a:t>
-            </a:r>
-            <a:endParaRPr lang="zh-CN" altLang="en-US"/>
-          </a:p>
-          <a:p>
-            <a:pPr marL="0" indent="0">
-              <a:buNone/>
-            </a:pPr>
-            <a:r>
-              <a:rPr lang="zh-CN" altLang="en-US"/>
-              <a:t>         </a:t>
-            </a:r>
-            <a:r>
-              <a:rPr lang="en-US" altLang="zh-CN">
-                <a:ea typeface="微软雅黑" panose="020B0503020204020204" charset="-122"/>
-              </a:rPr>
-              <a:t>CPK-soft: </a:t>
-            </a:r>
-            <a:r>
-              <a:rPr lang="zh-CN" altLang="en-US"/>
-              <a:t>免费下载，自动安装</a:t>
-            </a:r>
-            <a:endParaRPr lang="zh-CN" altLang="en-US"/>
-          </a:p>
-          <a:p>
-            <a:pPr marL="0" indent="0">
-              <a:buNone/>
-            </a:pPr>
-            <a:r>
-              <a:rPr lang="en-US" altLang="zh-CN"/>
-              <a:t>         CPK-chip: </a:t>
-            </a:r>
-            <a:r>
-              <a:rPr lang="zh-CN" altLang="en-US"/>
-              <a:t>网购，自动安装</a:t>
-            </a:r>
-            <a:endParaRPr lang="zh-CN" altLang="en-US"/>
-          </a:p>
-          <a:p>
-            <a:pPr marL="0" indent="0">
-              <a:buNone/>
-            </a:pPr>
-            <a:r>
-              <a:rPr lang="zh-CN" altLang="en-US"/>
-              <a:t>         支持系统：</a:t>
-            </a:r>
-            <a:r>
-              <a:rPr lang="en-US" altLang="zh-CN" sz="2400" b="1"/>
-              <a:t>Windows </a:t>
-            </a:r>
-            <a:r>
-              <a:rPr lang="zh-CN" altLang="en-US" sz="2400"/>
-              <a:t> </a:t>
-            </a:r>
-            <a:r>
-              <a:rPr lang="en-US" altLang="zh-CN" sz="2400" b="1"/>
-              <a:t>Android</a:t>
-            </a:r>
-            <a:endParaRPr lang="en-US" altLang="zh-CN" sz="2400" b="1"/>
-          </a:p>
-          <a:p>
-            <a:pPr marL="0" indent="0">
-              <a:lnSpc>
-                <a:spcPct val="100000"/>
-              </a:lnSpc>
-              <a:buNone/>
-            </a:pPr>
-            <a:r>
-              <a:rPr lang="zh-CN" altLang="en-US"/>
-              <a:t>          网上密钥管理</a:t>
-            </a:r>
-            <a:endParaRPr lang="en-US" altLang="zh-CN"/>
+              <a:t>      </a:t>
+            </a:r>
+            <a:endParaRPr lang="zh-CN" altLang="en-US"/>
           </a:p>
         </p:txBody>
       </p:sp>
@@ -6562,33 +6903,16 @@
         <p:txBody>
           <a:bodyPr/>
           <a:p>
-            <a:pPr algn="l"/>
-            <a:r>
-              <a:rPr lang="en-US" altLang="zh-CN" b="1">
-                <a:solidFill>
-                  <a:srgbClr val="002060"/>
-                </a:solidFill>
-                <a:latin typeface="Microsoft YaHei UI" panose="020B0503020204020204" charset="-122"/>
-                <a:ea typeface="Microsoft YaHei UI" panose="020B0503020204020204" charset="-122"/>
-              </a:rPr>
-              <a:t>CPK</a:t>
-            </a:r>
             <a:r>
               <a:rPr lang="zh-CN" altLang="en-US" b="1">
-                <a:solidFill>
-                  <a:srgbClr val="002060"/>
-                </a:solidFill>
-                <a:latin typeface="Microsoft YaHei UI" panose="020B0503020204020204" charset="-122"/>
-                <a:ea typeface="Microsoft YaHei UI" panose="020B0503020204020204" charset="-122"/>
-              </a:rPr>
-              <a:t>主要应用</a:t>
+                <a:latin typeface="微软雅黑" panose="020B0503020204020204" charset="-122"/>
+                <a:ea typeface="微软雅黑" panose="020B0503020204020204" charset="-122"/>
+              </a:rPr>
+              <a:t>提问</a:t>
             </a:r>
             <a:endParaRPr lang="zh-CN" altLang="en-US" b="1">
-              <a:solidFill>
-                <a:srgbClr val="002060"/>
-              </a:solidFill>
-              <a:latin typeface="Microsoft YaHei UI" panose="020B0503020204020204" charset="-122"/>
-              <a:ea typeface="Microsoft YaHei UI" panose="020B0503020204020204" charset="-122"/>
+              <a:latin typeface="微软雅黑" panose="020B0503020204020204" charset="-122"/>
+              <a:ea typeface="微软雅黑" panose="020B0503020204020204" charset="-122"/>
             </a:endParaRPr>
           </a:p>
         </p:txBody>
@@ -6603,178 +6927,46 @@
             <p:ph idx="1"/>
           </p:nvPr>
         </p:nvSpPr>
-        <p:spPr>
-          <a:xfrm>
-            <a:off x="838200" y="1825625"/>
-            <a:ext cx="10515600" cy="3841750"/>
-          </a:xfrm>
-        </p:spPr>
+        <p:spPr/>
         <p:txBody>
           <a:bodyPr/>
           <a:p>
             <a:pPr marL="0" indent="0">
               <a:buNone/>
             </a:pPr>
-            <a:r>
-              <a:rPr lang="zh-CN" altLang="en-US" b="1">
-                <a:solidFill>
-                  <a:srgbClr val="002060"/>
-                </a:solidFill>
-                <a:latin typeface="Microsoft YaHei UI" panose="020B0503020204020204" charset="-122"/>
-                <a:ea typeface="Microsoft YaHei UI" panose="020B0503020204020204" charset="-122"/>
-              </a:rPr>
-              <a:t>可证链接：</a:t>
-            </a:r>
-            <a:r>
-              <a:rPr lang="zh-CN" altLang="en-US" sz="2400"/>
-              <a:t>因特网、移动网、物联网、事联网可证链接</a:t>
-            </a:r>
-            <a:endParaRPr lang="zh-CN" altLang="en-US" sz="2400"/>
+            <a:endParaRPr lang="zh-CN" altLang="en-US"/>
           </a:p>
           <a:p>
             <a:pPr marL="0" indent="0">
               <a:buNone/>
             </a:pPr>
-            <a:r>
-              <a:rPr lang="zh-CN" altLang="en-US" sz="2400"/>
-              <a:t>                          为数据提供密钥加密</a:t>
-            </a:r>
-            <a:r>
-              <a:rPr lang="en-US" altLang="zh-CN" sz="2400"/>
-              <a:t>/</a:t>
-            </a:r>
-            <a:r>
-              <a:rPr lang="zh-CN" altLang="en-US" sz="2400"/>
-              <a:t>脱密服务；</a:t>
-            </a:r>
-            <a:endParaRPr lang="zh-CN" altLang="en-US" sz="2400"/>
+            <a:endParaRPr lang="zh-CN" altLang="en-US"/>
           </a:p>
           <a:p>
             <a:pPr marL="0" indent="0">
               <a:buNone/>
             </a:pPr>
-            <a:r>
-              <a:rPr lang="zh-CN" altLang="en-US" b="1">
-                <a:solidFill>
-                  <a:srgbClr val="002060"/>
-                </a:solidFill>
-                <a:latin typeface="Microsoft YaHei UI" panose="020B0503020204020204" charset="-122"/>
-                <a:ea typeface="Microsoft YaHei UI" panose="020B0503020204020204" charset="-122"/>
-                <a:sym typeface="+mn-ea"/>
-              </a:rPr>
-              <a:t>防伪标签：</a:t>
-            </a:r>
-            <a:r>
-              <a:rPr lang="zh-CN" altLang="en-US" sz="2400">
-                <a:solidFill>
-                  <a:schemeClr val="tx1"/>
-                </a:solidFill>
-                <a:latin typeface="+mn-ea"/>
-                <a:sym typeface="+mn-ea"/>
-              </a:rPr>
-              <a:t>纵向证明链和横向证明链</a:t>
-            </a:r>
-            <a:endParaRPr lang="zh-CN" altLang="en-US" sz="2400">
-              <a:solidFill>
-                <a:schemeClr val="tx1"/>
-              </a:solidFill>
-              <a:latin typeface="+mn-ea"/>
-              <a:sym typeface="+mn-ea"/>
+            <a:endParaRPr lang="zh-CN" altLang="en-US"/>
+          </a:p>
+          <a:p>
+            <a:pPr marL="0" indent="0">
+              <a:buNone/>
+            </a:pPr>
+            <a:r>
+              <a:rPr lang="zh-CN" altLang="en-US"/>
+              <a:t>                                                  </a:t>
+            </a:r>
+            <a:r>
+              <a:rPr lang="zh-CN" altLang="en-US" sz="6000" b="1">
+                <a:latin typeface="微软雅黑" panose="020B0503020204020204" charset="-122"/>
+                <a:ea typeface="微软雅黑" panose="020B0503020204020204" charset="-122"/>
+              </a:rPr>
+              <a:t>谢谢</a:t>
+            </a:r>
+            <a:endParaRPr lang="zh-CN" altLang="en-US" sz="6000" b="1">
+              <a:latin typeface="微软雅黑" panose="020B0503020204020204" charset="-122"/>
+              <a:ea typeface="微软雅黑" panose="020B0503020204020204" charset="-122"/>
             </a:endParaRPr>
-          </a:p>
-          <a:p>
-            <a:pPr marL="0" indent="0">
-              <a:buNone/>
-            </a:pPr>
-            <a:r>
-              <a:rPr lang="zh-CN" altLang="en-US" b="1">
-                <a:solidFill>
-                  <a:srgbClr val="002060"/>
-                </a:solidFill>
-                <a:latin typeface="Microsoft YaHei UI" panose="020B0503020204020204" charset="-122"/>
-                <a:ea typeface="Microsoft YaHei UI" panose="020B0503020204020204" charset="-122"/>
-              </a:rPr>
-              <a:t>双核计算：</a:t>
-            </a:r>
-            <a:r>
-              <a:rPr lang="zh-CN" altLang="en-US" sz="2400">
-                <a:latin typeface="+mn-ea"/>
-              </a:rPr>
-              <a:t>原内核继续管理软件的正常运行；</a:t>
-            </a:r>
-            <a:endParaRPr lang="zh-CN" altLang="en-US" sz="2400">
-              <a:latin typeface="+mn-ea"/>
-            </a:endParaRPr>
-          </a:p>
-          <a:p>
-            <a:pPr marL="0" indent="0">
-              <a:buNone/>
-            </a:pPr>
-            <a:r>
-              <a:rPr lang="zh-CN" altLang="en-US" sz="2400">
-                <a:latin typeface="+mn-ea"/>
-              </a:rPr>
-              <a:t>            </a:t>
-            </a:r>
-            <a:r>
-              <a:rPr lang="en-US" altLang="zh-CN" sz="2400">
-                <a:latin typeface="+mn-ea"/>
-              </a:rPr>
-              <a:t>CPK</a:t>
-            </a:r>
-            <a:r>
-              <a:rPr lang="zh-CN" altLang="en-US" sz="2400">
-                <a:latin typeface="+mn-ea"/>
-              </a:rPr>
-              <a:t>内核管理软件的真伪；（商标化软件）</a:t>
-            </a:r>
-            <a:endParaRPr lang="zh-CN" altLang="en-US" sz="2400">
-              <a:latin typeface="+mn-ea"/>
-            </a:endParaRPr>
-          </a:p>
-          <a:p>
-            <a:pPr marL="0" indent="0">
-              <a:buNone/>
-            </a:pPr>
-            <a:r>
-              <a:rPr lang="zh-CN" altLang="en-US" b="1">
-                <a:solidFill>
-                  <a:srgbClr val="002060"/>
-                </a:solidFill>
-                <a:latin typeface="Microsoft YaHei UI" panose="020B0503020204020204" charset="-122"/>
-                <a:ea typeface="Microsoft YaHei UI" panose="020B0503020204020204" charset="-122"/>
-              </a:rPr>
-              <a:t>数字户币：</a:t>
-            </a:r>
-            <a:r>
-              <a:rPr lang="zh-CN" altLang="en-US" sz="2400"/>
-              <a:t>数字户币在市面流通和网络流通；</a:t>
-            </a:r>
-            <a:endParaRPr lang="zh-CN" altLang="en-US" sz="2400"/>
-          </a:p>
-          <a:p>
-            <a:pPr marL="0" indent="0">
-              <a:buNone/>
-            </a:pPr>
-            <a:r>
-              <a:rPr lang="zh-CN" altLang="en-US" sz="2400"/>
-              <a:t>                          </a:t>
-            </a:r>
-            <a:r>
-              <a:rPr lang="zh-CN" altLang="en-US" sz="2400">
-                <a:sym typeface="+mn-ea"/>
-              </a:rPr>
-              <a:t>数字户币</a:t>
-            </a:r>
-            <a:r>
-              <a:rPr lang="zh-CN" altLang="en-US" sz="2400"/>
-              <a:t>不怕被窃、不怕遗失 </a:t>
-            </a:r>
-            <a:r>
-              <a:rPr lang="zh-CN" altLang="en-US"/>
-              <a:t>      </a:t>
-            </a:r>
-            <a:endParaRPr lang="zh-CN" altLang="en-US"/>
           </a:p>
         </p:txBody>
       </p:sp>

</xml_diff>